<commit_message>
Kubernetes and Docker PPT Updated
Kubernetes and Docker PPT Updated
</commit_message>
<xml_diff>
--- a/docs/Kubernetes.pptx
+++ b/docs/Kubernetes.pptx
@@ -12092,7 +12092,7 @@
                 <a:cs typeface="Roboto"/>
                 <a:sym typeface="Roboto"/>
               </a:rPr>
-              <a:t>Here pods is nothing but collection of containers, we can multiple pod records if i deploy another java docker image.</a:t>
+              <a:t>Here pods is nothing but collection of containers, we can have multiple pod records if i deploy another java docker image.</a:t>
             </a:r>
             <a:endParaRPr sz="1200">
               <a:solidFill>
@@ -20525,7 +20525,7 @@
                 <a:cs typeface="Roboto Mono"/>
                 <a:sym typeface="Roboto Mono"/>
               </a:rPr>
-              <a:t>Sudo usermod -aG $USER &amp;&amp; newgrp docker</a:t>
+              <a:t>sudo usermod -aG docker $USER &amp;&amp; newgrp docker</a:t>
             </a:r>
             <a:endParaRPr sz="1050">
               <a:solidFill>

</xml_diff>